<commit_message>
new res question, proposition
</commit_message>
<xml_diff>
--- a/figure/V-Model.pptx
+++ b/figure/V-Model.pptx
@@ -6,6 +6,7 @@
   </p:sldMasterIdLst>
   <p:sldIdLst>
     <p:sldId id="256" r:id="rId2"/>
+    <p:sldId id="257" r:id="rId3"/>
   </p:sldIdLst>
   <p:sldSz cx="9144000" cy="6858000" type="screen4x3"/>
   <p:notesSz cx="6858000" cy="9144000"/>
@@ -3816,6 +3817,60 @@
     <p:extLst>
       <p:ext uri="{BB962C8B-B14F-4D97-AF65-F5344CB8AC3E}">
         <p14:creationId xmlns:p14="http://schemas.microsoft.com/office/powerpoint/2010/main" val="3177689304"/>
+      </p:ext>
+    </p:extLst>
+  </p:cSld>
+  <p:clrMapOvr>
+    <a:masterClrMapping/>
+  </p:clrMapOvr>
+</p:sld>
+</file>
+
+<file path=ppt/slides/slide2.xml><?xml version="1.0" encoding="utf-8"?>
+<p:sld xmlns:a="http://schemas.openxmlformats.org/drawingml/2006/main" xmlns:r="http://schemas.openxmlformats.org/officeDocument/2006/relationships" xmlns:p="http://schemas.openxmlformats.org/presentationml/2006/main">
+  <p:cSld>
+    <p:spTree>
+      <p:nvGrpSpPr>
+        <p:cNvPr id="1" name=""/>
+        <p:cNvGrpSpPr/>
+        <p:nvPr/>
+      </p:nvGrpSpPr>
+      <p:grpSpPr>
+        <a:xfrm>
+          <a:off x="0" y="0"/>
+          <a:ext cx="0" cy="0"/>
+          <a:chOff x="0" y="0"/>
+          <a:chExt cx="0" cy="0"/>
+        </a:xfrm>
+      </p:grpSpPr>
+      <p:pic>
+        <p:nvPicPr>
+          <p:cNvPr id="4" name="Picture 3"/>
+          <p:cNvPicPr>
+            <a:picLocks noChangeAspect="1"/>
+          </p:cNvPicPr>
+          <p:nvPr/>
+        </p:nvPicPr>
+        <p:blipFill>
+          <a:blip r:embed="rId2"/>
+          <a:stretch>
+            <a:fillRect/>
+          </a:stretch>
+        </p:blipFill>
+        <p:spPr>
+          <a:xfrm>
+            <a:off x="1282700" y="838200"/>
+            <a:ext cx="6578600" cy="5181600"/>
+          </a:xfrm>
+          <a:prstGeom prst="rect">
+            <a:avLst/>
+          </a:prstGeom>
+        </p:spPr>
+      </p:pic>
+    </p:spTree>
+    <p:extLst>
+      <p:ext uri="{BB962C8B-B14F-4D97-AF65-F5344CB8AC3E}">
+        <p14:creationId xmlns:p14="http://schemas.microsoft.com/office/powerpoint/2010/main" val="4122035242"/>
       </p:ext>
     </p:extLst>
   </p:cSld>

</xml_diff>